<commit_message>
fix figure 1 and 2
</commit_message>
<xml_diff>
--- a/doc/UserGuide.pptx
+++ b/doc/UserGuide.pptx
@@ -5,9 +5,8 @@
     <p:sldMasterId id="2147483648" r:id="rId1"/>
   </p:sldMasterIdLst>
   <p:sldIdLst>
-    <p:sldId id="256" r:id="rId2"/>
-    <p:sldId id="257" r:id="rId3"/>
-    <p:sldId id="258" r:id="rId4"/>
+    <p:sldId id="259" r:id="rId2"/>
+    <p:sldId id="260" r:id="rId3"/>
   </p:sldIdLst>
   <p:sldSz cx="12192000" cy="6858000"/>
   <p:notesSz cx="6858000" cy="9144000"/>
@@ -245,7 +244,7 @@
           <a:p>
             <a:fld id="{81EB79EC-C7E3-4EC7-84B9-0BB9050C86D2}" type="datetimeFigureOut">
               <a:rPr lang="en-SG" smtClean="0"/>
-              <a:t>19/10/2016</a:t>
+              <a:t>5/11/2016</a:t>
             </a:fld>
             <a:endParaRPr lang="en-SG"/>
           </a:p>
@@ -415,7 +414,7 @@
           <a:p>
             <a:fld id="{81EB79EC-C7E3-4EC7-84B9-0BB9050C86D2}" type="datetimeFigureOut">
               <a:rPr lang="en-SG" smtClean="0"/>
-              <a:t>19/10/2016</a:t>
+              <a:t>5/11/2016</a:t>
             </a:fld>
             <a:endParaRPr lang="en-SG"/>
           </a:p>
@@ -595,7 +594,7 @@
           <a:p>
             <a:fld id="{81EB79EC-C7E3-4EC7-84B9-0BB9050C86D2}" type="datetimeFigureOut">
               <a:rPr lang="en-SG" smtClean="0"/>
-              <a:t>19/10/2016</a:t>
+              <a:t>5/11/2016</a:t>
             </a:fld>
             <a:endParaRPr lang="en-SG"/>
           </a:p>
@@ -765,7 +764,7 @@
           <a:p>
             <a:fld id="{81EB79EC-C7E3-4EC7-84B9-0BB9050C86D2}" type="datetimeFigureOut">
               <a:rPr lang="en-SG" smtClean="0"/>
-              <a:t>19/10/2016</a:t>
+              <a:t>5/11/2016</a:t>
             </a:fld>
             <a:endParaRPr lang="en-SG"/>
           </a:p>
@@ -1011,7 +1010,7 @@
           <a:p>
             <a:fld id="{81EB79EC-C7E3-4EC7-84B9-0BB9050C86D2}" type="datetimeFigureOut">
               <a:rPr lang="en-SG" smtClean="0"/>
-              <a:t>19/10/2016</a:t>
+              <a:t>5/11/2016</a:t>
             </a:fld>
             <a:endParaRPr lang="en-SG"/>
           </a:p>
@@ -1243,7 +1242,7 @@
           <a:p>
             <a:fld id="{81EB79EC-C7E3-4EC7-84B9-0BB9050C86D2}" type="datetimeFigureOut">
               <a:rPr lang="en-SG" smtClean="0"/>
-              <a:t>19/10/2016</a:t>
+              <a:t>5/11/2016</a:t>
             </a:fld>
             <a:endParaRPr lang="en-SG"/>
           </a:p>
@@ -1610,7 +1609,7 @@
           <a:p>
             <a:fld id="{81EB79EC-C7E3-4EC7-84B9-0BB9050C86D2}" type="datetimeFigureOut">
               <a:rPr lang="en-SG" smtClean="0"/>
-              <a:t>19/10/2016</a:t>
+              <a:t>5/11/2016</a:t>
             </a:fld>
             <a:endParaRPr lang="en-SG"/>
           </a:p>
@@ -1728,7 +1727,7 @@
           <a:p>
             <a:fld id="{81EB79EC-C7E3-4EC7-84B9-0BB9050C86D2}" type="datetimeFigureOut">
               <a:rPr lang="en-SG" smtClean="0"/>
-              <a:t>19/10/2016</a:t>
+              <a:t>5/11/2016</a:t>
             </a:fld>
             <a:endParaRPr lang="en-SG"/>
           </a:p>
@@ -1823,7 +1822,7 @@
           <a:p>
             <a:fld id="{81EB79EC-C7E3-4EC7-84B9-0BB9050C86D2}" type="datetimeFigureOut">
               <a:rPr lang="en-SG" smtClean="0"/>
-              <a:t>19/10/2016</a:t>
+              <a:t>5/11/2016</a:t>
             </a:fld>
             <a:endParaRPr lang="en-SG"/>
           </a:p>
@@ -2100,7 +2099,7 @@
           <a:p>
             <a:fld id="{81EB79EC-C7E3-4EC7-84B9-0BB9050C86D2}" type="datetimeFigureOut">
               <a:rPr lang="en-SG" smtClean="0"/>
-              <a:t>19/10/2016</a:t>
+              <a:t>5/11/2016</a:t>
             </a:fld>
             <a:endParaRPr lang="en-SG"/>
           </a:p>
@@ -2353,7 +2352,7 @@
           <a:p>
             <a:fld id="{81EB79EC-C7E3-4EC7-84B9-0BB9050C86D2}" type="datetimeFigureOut">
               <a:rPr lang="en-SG" smtClean="0"/>
-              <a:t>19/10/2016</a:t>
+              <a:t>5/11/2016</a:t>
             </a:fld>
             <a:endParaRPr lang="en-SG"/>
           </a:p>
@@ -2566,7 +2565,7 @@
           <a:p>
             <a:fld id="{81EB79EC-C7E3-4EC7-84B9-0BB9050C86D2}" type="datetimeFigureOut">
               <a:rPr lang="en-SG" smtClean="0"/>
-              <a:t>19/10/2016</a:t>
+              <a:t>5/11/2016</a:t>
             </a:fld>
             <a:endParaRPr lang="en-SG"/>
           </a:p>
@@ -2973,117 +2972,80 @@
       </p:grpSpPr>
       <p:grpSp>
         <p:nvGrpSpPr>
-          <p:cNvPr id="3" name="Group 2"/>
+          <p:cNvPr id="14" name="Group 13"/>
           <p:cNvGrpSpPr/>
           <p:nvPr/>
         </p:nvGrpSpPr>
         <p:grpSpPr>
           <a:xfrm>
-            <a:off x="1887521" y="1201338"/>
-            <a:ext cx="6367245" cy="4097889"/>
-            <a:chOff x="1887521" y="1201338"/>
-            <a:chExt cx="6367245" cy="4097889"/>
+            <a:off x="1031846" y="335560"/>
+            <a:ext cx="9000000" cy="5800110"/>
+            <a:chOff x="1031846" y="335560"/>
+            <a:chExt cx="9000000" cy="5800110"/>
           </a:xfrm>
         </p:grpSpPr>
-        <p:grpSp>
-          <p:nvGrpSpPr>
-            <p:cNvPr id="7" name="Group 6"/>
-            <p:cNvGrpSpPr/>
-            <p:nvPr/>
-          </p:nvGrpSpPr>
-          <p:grpSpPr>
-            <a:xfrm>
-              <a:off x="1887521" y="1201338"/>
-              <a:ext cx="6367245" cy="3790112"/>
-              <a:chOff x="1887521" y="1201338"/>
-              <a:chExt cx="6367245" cy="3790112"/>
-            </a:xfrm>
-          </p:grpSpPr>
-          <p:pic>
-            <p:nvPicPr>
-              <p:cNvPr id="5" name="Picture 4"/>
-              <p:cNvPicPr>
-                <a:picLocks noChangeAspect="1"/>
-              </p:cNvPicPr>
-              <p:nvPr/>
-            </p:nvPicPr>
-            <p:blipFill rotWithShape="1">
-              <a:blip r:embed="rId2"/>
-              <a:srcRect l="23394" t="11157" r="24381" b="33578"/>
-              <a:stretch/>
-            </p:blipFill>
-            <p:spPr>
-              <a:xfrm>
-                <a:off x="1887521" y="1201338"/>
-                <a:ext cx="6367245" cy="3790112"/>
-              </a:xfrm>
-              <a:prstGeom prst="rect">
-                <a:avLst/>
-              </a:prstGeom>
-              <a:ln>
-                <a:solidFill>
-                  <a:schemeClr val="accent1"/>
-                </a:solidFill>
-              </a:ln>
-            </p:spPr>
-          </p:pic>
-          <p:sp>
-            <p:nvSpPr>
-              <p:cNvPr id="6" name="Oval 5"/>
-              <p:cNvSpPr/>
-              <p:nvPr/>
-            </p:nvSpPr>
-            <p:spPr>
-              <a:xfrm>
-                <a:off x="3179428" y="3900881"/>
-                <a:ext cx="931178" cy="385893"/>
-              </a:xfrm>
-              <a:prstGeom prst="ellipse">
-                <a:avLst/>
-              </a:prstGeom>
-              <a:noFill/>
-              <a:ln>
-                <a:solidFill>
-                  <a:schemeClr val="accent2"/>
-                </a:solidFill>
-              </a:ln>
-            </p:spPr>
-            <p:style>
-              <a:lnRef idx="2">
-                <a:schemeClr val="accent1">
-                  <a:shade val="50000"/>
-                </a:schemeClr>
-              </a:lnRef>
-              <a:fillRef idx="1">
-                <a:schemeClr val="accent1"/>
-              </a:fillRef>
-              <a:effectRef idx="0">
-                <a:schemeClr val="accent1"/>
-              </a:effectRef>
-              <a:fontRef idx="minor">
-                <a:schemeClr val="lt1"/>
-              </a:fontRef>
-            </p:style>
-            <p:txBody>
-              <a:bodyPr rtlCol="0" anchor="ctr"/>
-              <a:lstStyle/>
-              <a:p>
-                <a:pPr algn="ctr"/>
-                <a:endParaRPr lang="en-SG"/>
-              </a:p>
-            </p:txBody>
-          </p:sp>
-        </p:grpSp>
         <p:sp>
           <p:nvSpPr>
-            <p:cNvPr id="2" name="TextBox 1"/>
+            <p:cNvPr id="4" name="Rectangle 3"/>
+            <p:cNvSpPr/>
+            <p:nvPr/>
+          </p:nvSpPr>
+          <p:spPr>
+            <a:xfrm>
+              <a:off x="1031846" y="335560"/>
+              <a:ext cx="9000000" cy="5400000"/>
+            </a:xfrm>
+            <a:prstGeom prst="rect">
+              <a:avLst/>
+            </a:prstGeom>
+            <a:noFill/>
+            <a:ln>
+              <a:solidFill>
+                <a:schemeClr val="tx1"/>
+              </a:solidFill>
+            </a:ln>
+          </p:spPr>
+          <p:style>
+            <a:lnRef idx="2">
+              <a:schemeClr val="accent1">
+                <a:shade val="50000"/>
+              </a:schemeClr>
+            </a:lnRef>
+            <a:fillRef idx="1">
+              <a:schemeClr val="accent1"/>
+            </a:fillRef>
+            <a:effectRef idx="0">
+              <a:schemeClr val="accent1"/>
+            </a:effectRef>
+            <a:fontRef idx="minor">
+              <a:schemeClr val="lt1"/>
+            </a:fontRef>
+          </p:style>
+          <p:txBody>
+            <a:bodyPr rtlCol="0" anchor="ctr"/>
+            <a:lstStyle/>
+            <a:p>
+              <a:pPr algn="ctr"/>
+              <a:endParaRPr lang="en-SG" dirty="0">
+                <a:solidFill>
+                  <a:schemeClr val="accent2">
+                    <a:lumMod val="75000"/>
+                  </a:schemeClr>
+                </a:solidFill>
+              </a:endParaRPr>
+            </a:p>
+          </p:txBody>
+        </p:sp>
+        <p:sp>
+          <p:nvSpPr>
+            <p:cNvPr id="5" name="TextBox 4"/>
             <p:cNvSpPr txBox="1"/>
             <p:nvPr/>
           </p:nvSpPr>
           <p:spPr>
             <a:xfrm>
-              <a:off x="1887522" y="4991450"/>
-              <a:ext cx="2676090" cy="307777"/>
+              <a:off x="1031846" y="5735560"/>
+              <a:ext cx="4163319" cy="400110"/>
             </a:xfrm>
             <a:prstGeom prst="rect">
               <a:avLst/>
@@ -3091,29 +3053,90 @@
             <a:noFill/>
           </p:spPr>
           <p:txBody>
-            <a:bodyPr wrap="square" rtlCol="0">
+            <a:bodyPr wrap="none" rtlCol="0">
               <a:spAutoFit/>
             </a:bodyPr>
             <a:lstStyle/>
             <a:p>
               <a:r>
-                <a:rPr lang="en-SG" sz="1400" dirty="0">
+                <a:rPr lang="en-SG" sz="2000" dirty="0">
                   <a:solidFill>
-                    <a:schemeClr val="accent1"/>
+                    <a:schemeClr val="accent6">
+                      <a:lumMod val="75000"/>
+                    </a:schemeClr>
                   </a:solidFill>
-                  <a:latin typeface="Franklin Gothic Medium Cond" panose="020B0606030402020204" pitchFamily="34" charset="0"/>
-                  <a:cs typeface="Times New Roman" panose="02020603050405020304" pitchFamily="18" charset="0"/>
+                  <a:latin typeface="Eras Light ITC" panose="020B0402030504020804" pitchFamily="34" charset="0"/>
                 </a:rPr>
                 <a:t>Figure 1: Downloading linenux.jar file</a:t>
               </a:r>
             </a:p>
           </p:txBody>
         </p:sp>
+        <p:cxnSp>
+          <p:nvCxnSpPr>
+            <p:cNvPr id="9" name="Straight Connector 8"/>
+            <p:cNvCxnSpPr/>
+            <p:nvPr/>
+          </p:nvCxnSpPr>
+          <p:spPr>
+            <a:xfrm>
+              <a:off x="1031846" y="335560"/>
+              <a:ext cx="9000000" cy="5400000"/>
+            </a:xfrm>
+            <a:prstGeom prst="line">
+              <a:avLst/>
+            </a:prstGeom>
+          </p:spPr>
+          <p:style>
+            <a:lnRef idx="1">
+              <a:schemeClr val="accent2"/>
+            </a:lnRef>
+            <a:fillRef idx="0">
+              <a:schemeClr val="accent2"/>
+            </a:fillRef>
+            <a:effectRef idx="0">
+              <a:schemeClr val="accent2"/>
+            </a:effectRef>
+            <a:fontRef idx="minor">
+              <a:schemeClr val="tx1"/>
+            </a:fontRef>
+          </p:style>
+        </p:cxnSp>
+        <p:cxnSp>
+          <p:nvCxnSpPr>
+            <p:cNvPr id="11" name="Straight Connector 10"/>
+            <p:cNvCxnSpPr/>
+            <p:nvPr/>
+          </p:nvCxnSpPr>
+          <p:spPr>
+            <a:xfrm flipV="1">
+              <a:off x="1031846" y="335560"/>
+              <a:ext cx="9000000" cy="5400000"/>
+            </a:xfrm>
+            <a:prstGeom prst="line">
+              <a:avLst/>
+            </a:prstGeom>
+          </p:spPr>
+          <p:style>
+            <a:lnRef idx="1">
+              <a:schemeClr val="accent2"/>
+            </a:lnRef>
+            <a:fillRef idx="0">
+              <a:schemeClr val="accent2"/>
+            </a:fillRef>
+            <a:effectRef idx="0">
+              <a:schemeClr val="accent2"/>
+            </a:effectRef>
+            <a:fontRef idx="minor">
+              <a:schemeClr val="tx1"/>
+            </a:fontRef>
+          </p:style>
+        </p:cxnSp>
       </p:grpSp>
     </p:spTree>
     <p:extLst>
       <p:ext uri="{BB962C8B-B14F-4D97-AF65-F5344CB8AC3E}">
-        <p14:creationId xmlns:p14="http://schemas.microsoft.com/office/powerpoint/2010/main" val="2276232894"/>
+        <p14:creationId xmlns:p14="http://schemas.microsoft.com/office/powerpoint/2010/main" val="400309735"/>
       </p:ext>
     </p:extLst>
   </p:cSld>
@@ -3142,56 +3165,21 @@
       </p:grpSpPr>
       <p:grpSp>
         <p:nvGrpSpPr>
-          <p:cNvPr id="6" name="Group 5"/>
+          <p:cNvPr id="14" name="Group 13"/>
           <p:cNvGrpSpPr/>
           <p:nvPr/>
         </p:nvGrpSpPr>
         <p:grpSpPr>
           <a:xfrm>
-            <a:off x="1745342" y="424206"/>
-            <a:ext cx="9014832" cy="5089502"/>
-            <a:chOff x="1745342" y="424206"/>
-            <a:chExt cx="9014832" cy="5089502"/>
+            <a:off x="1031846" y="335560"/>
+            <a:ext cx="9001386" cy="5800110"/>
+            <a:chOff x="1031846" y="335560"/>
+            <a:chExt cx="9001386" cy="5800110"/>
           </a:xfrm>
         </p:grpSpPr>
-        <p:sp>
-          <p:nvSpPr>
-            <p:cNvPr id="3" name="TextBox 2"/>
-            <p:cNvSpPr txBox="1"/>
-            <p:nvPr/>
-          </p:nvSpPr>
-          <p:spPr>
-            <a:xfrm>
-              <a:off x="1745342" y="5205931"/>
-              <a:ext cx="2676090" cy="307777"/>
-            </a:xfrm>
-            <a:prstGeom prst="rect">
-              <a:avLst/>
-            </a:prstGeom>
-            <a:noFill/>
-          </p:spPr>
-          <p:txBody>
-            <a:bodyPr wrap="square" rtlCol="0">
-              <a:spAutoFit/>
-            </a:bodyPr>
-            <a:lstStyle/>
-            <a:p>
-              <a:r>
-                <a:rPr lang="en-SG" sz="1400" dirty="0">
-                  <a:solidFill>
-                    <a:schemeClr val="accent1"/>
-                  </a:solidFill>
-                  <a:latin typeface="Franklin Gothic Medium Cond" panose="020B0606030402020204" pitchFamily="34" charset="0"/>
-                  <a:cs typeface="Times New Roman" panose="02020603050405020304" pitchFamily="18" charset="0"/>
-                </a:rPr>
-                <a:t>Figure 2: Linenux’s main window</a:t>
-              </a:r>
-            </a:p>
-          </p:txBody>
-        </p:sp>
         <p:pic>
           <p:nvPicPr>
-            <p:cNvPr id="5" name="Picture 4"/>
+            <p:cNvPr id="4" name="Picture 3"/>
             <p:cNvPicPr>
               <a:picLocks noChangeAspect="1"/>
             </p:cNvPicPr>
@@ -3199,408 +3187,29 @@
           </p:nvPicPr>
           <p:blipFill rotWithShape="1">
             <a:blip r:embed="rId2"/>
-            <a:srcRect b="5701"/>
+            <a:srcRect b="3670"/>
             <a:stretch/>
           </p:blipFill>
           <p:spPr>
             <a:xfrm>
-              <a:off x="1745342" y="424206"/>
-              <a:ext cx="9014832" cy="4781725"/>
+              <a:off x="1031846" y="335560"/>
+              <a:ext cx="9001386" cy="5400000"/>
             </a:xfrm>
             <a:prstGeom prst="rect">
               <a:avLst/>
             </a:prstGeom>
-            <a:ln>
-              <a:solidFill>
-                <a:schemeClr val="tx1"/>
-              </a:solidFill>
-            </a:ln>
           </p:spPr>
         </p:pic>
-      </p:grpSp>
-    </p:spTree>
-    <p:extLst>
-      <p:ext uri="{BB962C8B-B14F-4D97-AF65-F5344CB8AC3E}">
-        <p14:creationId xmlns:p14="http://schemas.microsoft.com/office/powerpoint/2010/main" val="2496238807"/>
-      </p:ext>
-    </p:extLst>
-  </p:cSld>
-  <p:clrMapOvr>
-    <a:masterClrMapping/>
-  </p:clrMapOvr>
-</p:sld>
-</file>
-
-<file path=ppt/slides/slide3.xml><?xml version="1.0" encoding="utf-8"?>
-<p:sld xmlns:a="http://schemas.openxmlformats.org/drawingml/2006/main" xmlns:r="http://schemas.openxmlformats.org/officeDocument/2006/relationships" xmlns:p="http://schemas.openxmlformats.org/presentationml/2006/main">
-  <p:cSld>
-    <p:spTree>
-      <p:nvGrpSpPr>
-        <p:cNvPr id="1" name=""/>
-        <p:cNvGrpSpPr/>
-        <p:nvPr/>
-      </p:nvGrpSpPr>
-      <p:grpSpPr>
-        <a:xfrm>
-          <a:off x="0" y="0"/>
-          <a:ext cx="0" cy="0"/>
-          <a:chOff x="0" y="0"/>
-          <a:chExt cx="0" cy="0"/>
-        </a:xfrm>
-      </p:grpSpPr>
-      <p:grpSp>
-        <p:nvGrpSpPr>
-          <p:cNvPr id="14" name="Group 13"/>
-          <p:cNvGrpSpPr/>
-          <p:nvPr/>
-        </p:nvGrpSpPr>
-        <p:grpSpPr>
-          <a:xfrm>
-            <a:off x="2223081" y="1459684"/>
-            <a:ext cx="6493080" cy="3629818"/>
-            <a:chOff x="2223081" y="1459684"/>
-            <a:chExt cx="6493080" cy="3629818"/>
-          </a:xfrm>
-        </p:grpSpPr>
         <p:sp>
           <p:nvSpPr>
-            <p:cNvPr id="2" name="Rectangle 1"/>
-            <p:cNvSpPr/>
-            <p:nvPr/>
-          </p:nvSpPr>
-          <p:spPr>
-            <a:xfrm>
-              <a:off x="2223082" y="1459684"/>
-              <a:ext cx="6493079" cy="3322041"/>
-            </a:xfrm>
-            <a:prstGeom prst="rect">
-              <a:avLst/>
-            </a:prstGeom>
-            <a:solidFill>
-              <a:schemeClr val="tx2">
-                <a:lumMod val="60000"/>
-                <a:lumOff val="40000"/>
-              </a:schemeClr>
-            </a:solidFill>
-            <a:ln>
-              <a:noFill/>
-            </a:ln>
-          </p:spPr>
-          <p:style>
-            <a:lnRef idx="2">
-              <a:schemeClr val="accent1">
-                <a:shade val="50000"/>
-              </a:schemeClr>
-            </a:lnRef>
-            <a:fillRef idx="1">
-              <a:schemeClr val="accent1"/>
-            </a:fillRef>
-            <a:effectRef idx="0">
-              <a:schemeClr val="accent1"/>
-            </a:effectRef>
-            <a:fontRef idx="minor">
-              <a:schemeClr val="lt1"/>
-            </a:fontRef>
-          </p:style>
-          <p:txBody>
-            <a:bodyPr rtlCol="0" anchor="ctr"/>
-            <a:lstStyle/>
-            <a:p>
-              <a:pPr algn="ctr"/>
-              <a:endParaRPr lang="en-SG"/>
-            </a:p>
-          </p:txBody>
-        </p:sp>
-        <p:sp>
-          <p:nvSpPr>
-            <p:cNvPr id="3" name="Rectangle 2"/>
-            <p:cNvSpPr/>
-            <p:nvPr/>
-          </p:nvSpPr>
-          <p:spPr>
-            <a:xfrm>
-              <a:off x="2223082" y="4286774"/>
-              <a:ext cx="6493079" cy="494951"/>
-            </a:xfrm>
-            <a:prstGeom prst="rect">
-              <a:avLst/>
-            </a:prstGeom>
-            <a:solidFill>
-              <a:schemeClr val="tx2">
-                <a:lumMod val="40000"/>
-                <a:lumOff val="60000"/>
-              </a:schemeClr>
-            </a:solidFill>
-            <a:ln>
-              <a:noFill/>
-            </a:ln>
-          </p:spPr>
-          <p:style>
-            <a:lnRef idx="2">
-              <a:schemeClr val="accent1">
-                <a:shade val="50000"/>
-              </a:schemeClr>
-            </a:lnRef>
-            <a:fillRef idx="1">
-              <a:schemeClr val="accent1"/>
-            </a:fillRef>
-            <a:effectRef idx="0">
-              <a:schemeClr val="accent1"/>
-            </a:effectRef>
-            <a:fontRef idx="minor">
-              <a:schemeClr val="lt1"/>
-            </a:fontRef>
-          </p:style>
-          <p:txBody>
-            <a:bodyPr rtlCol="0" anchor="ctr"/>
-            <a:lstStyle/>
-            <a:p>
-              <a:pPr algn="ctr"/>
-              <a:endParaRPr lang="en-SG" dirty="0"/>
-            </a:p>
-          </p:txBody>
-        </p:sp>
-        <p:sp>
-          <p:nvSpPr>
-            <p:cNvPr id="4" name="Rectangle: Rounded Corners 3"/>
-            <p:cNvSpPr/>
-            <p:nvPr/>
-          </p:nvSpPr>
-          <p:spPr>
-            <a:xfrm>
-              <a:off x="2382473" y="1652631"/>
-              <a:ext cx="1359017" cy="2508308"/>
-            </a:xfrm>
-            <a:prstGeom prst="roundRect">
-              <a:avLst/>
-            </a:prstGeom>
-            <a:solidFill>
-              <a:schemeClr val="accent2">
-                <a:lumMod val="20000"/>
-                <a:lumOff val="80000"/>
-              </a:schemeClr>
-            </a:solidFill>
-            <a:ln>
-              <a:noFill/>
-            </a:ln>
-          </p:spPr>
-          <p:style>
-            <a:lnRef idx="2">
-              <a:schemeClr val="accent1">
-                <a:shade val="50000"/>
-              </a:schemeClr>
-            </a:lnRef>
-            <a:fillRef idx="1">
-              <a:schemeClr val="accent1"/>
-            </a:fillRef>
-            <a:effectRef idx="0">
-              <a:schemeClr val="accent1"/>
-            </a:effectRef>
-            <a:fontRef idx="minor">
-              <a:schemeClr val="lt1"/>
-            </a:fontRef>
-          </p:style>
-          <p:txBody>
-            <a:bodyPr rtlCol="0" anchor="ctr"/>
-            <a:lstStyle/>
-            <a:p>
-              <a:pPr algn="ctr"/>
-              <a:endParaRPr lang="en-SG"/>
-            </a:p>
-          </p:txBody>
-        </p:sp>
-        <p:sp>
-          <p:nvSpPr>
-            <p:cNvPr id="5" name="Rectangle: Rounded Corners 4"/>
-            <p:cNvSpPr/>
-            <p:nvPr/>
-          </p:nvSpPr>
-          <p:spPr>
-            <a:xfrm>
-              <a:off x="3977780" y="1652631"/>
-              <a:ext cx="1359017" cy="2508308"/>
-            </a:xfrm>
-            <a:prstGeom prst="roundRect">
-              <a:avLst/>
-            </a:prstGeom>
-            <a:solidFill>
-              <a:schemeClr val="accent1">
-                <a:lumMod val="20000"/>
-                <a:lumOff val="80000"/>
-              </a:schemeClr>
-            </a:solidFill>
-            <a:ln>
-              <a:noFill/>
-            </a:ln>
-          </p:spPr>
-          <p:style>
-            <a:lnRef idx="2">
-              <a:schemeClr val="accent1">
-                <a:shade val="50000"/>
-              </a:schemeClr>
-            </a:lnRef>
-            <a:fillRef idx="1">
-              <a:schemeClr val="accent1"/>
-            </a:fillRef>
-            <a:effectRef idx="0">
-              <a:schemeClr val="accent1"/>
-            </a:effectRef>
-            <a:fontRef idx="minor">
-              <a:schemeClr val="lt1"/>
-            </a:fontRef>
-          </p:style>
-          <p:txBody>
-            <a:bodyPr rtlCol="0" anchor="ctr"/>
-            <a:lstStyle/>
-            <a:p>
-              <a:pPr algn="ctr"/>
-              <a:endParaRPr lang="en-SG"/>
-            </a:p>
-          </p:txBody>
-        </p:sp>
-        <p:sp>
-          <p:nvSpPr>
-            <p:cNvPr id="6" name="Rectangle: Rounded Corners 5"/>
-            <p:cNvSpPr/>
-            <p:nvPr/>
-          </p:nvSpPr>
-          <p:spPr>
-            <a:xfrm>
-              <a:off x="5573087" y="1652631"/>
-              <a:ext cx="1359017" cy="2508308"/>
-            </a:xfrm>
-            <a:prstGeom prst="roundRect">
-              <a:avLst/>
-            </a:prstGeom>
-            <a:solidFill>
-              <a:schemeClr val="accent6">
-                <a:lumMod val="20000"/>
-                <a:lumOff val="80000"/>
-              </a:schemeClr>
-            </a:solidFill>
-            <a:ln>
-              <a:noFill/>
-            </a:ln>
-          </p:spPr>
-          <p:style>
-            <a:lnRef idx="2">
-              <a:schemeClr val="accent1">
-                <a:shade val="50000"/>
-              </a:schemeClr>
-            </a:lnRef>
-            <a:fillRef idx="1">
-              <a:schemeClr val="accent1"/>
-            </a:fillRef>
-            <a:effectRef idx="0">
-              <a:schemeClr val="accent1"/>
-            </a:effectRef>
-            <a:fontRef idx="minor">
-              <a:schemeClr val="lt1"/>
-            </a:fontRef>
-          </p:style>
-          <p:txBody>
-            <a:bodyPr rtlCol="0" anchor="ctr"/>
-            <a:lstStyle/>
-            <a:p>
-              <a:pPr algn="ctr"/>
-              <a:endParaRPr lang="en-SG" dirty="0"/>
-            </a:p>
-          </p:txBody>
-        </p:sp>
-        <p:sp>
-          <p:nvSpPr>
-            <p:cNvPr id="7" name="Rectangle: Rounded Corners 6"/>
-            <p:cNvSpPr/>
-            <p:nvPr/>
-          </p:nvSpPr>
-          <p:spPr>
-            <a:xfrm>
-              <a:off x="7168394" y="1652631"/>
-              <a:ext cx="1359017" cy="2508308"/>
-            </a:xfrm>
-            <a:prstGeom prst="roundRect">
-              <a:avLst/>
-            </a:prstGeom>
-            <a:solidFill>
-              <a:schemeClr val="accent4">
-                <a:lumMod val="20000"/>
-                <a:lumOff val="80000"/>
-              </a:schemeClr>
-            </a:solidFill>
-            <a:ln>
-              <a:noFill/>
-            </a:ln>
-          </p:spPr>
-          <p:style>
-            <a:lnRef idx="2">
-              <a:schemeClr val="accent1">
-                <a:shade val="50000"/>
-              </a:schemeClr>
-            </a:lnRef>
-            <a:fillRef idx="1">
-              <a:schemeClr val="accent1"/>
-            </a:fillRef>
-            <a:effectRef idx="0">
-              <a:schemeClr val="accent1"/>
-            </a:effectRef>
-            <a:fontRef idx="minor">
-              <a:schemeClr val="lt1"/>
-            </a:fontRef>
-          </p:style>
-          <p:txBody>
-            <a:bodyPr rtlCol="0" anchor="ctr"/>
-            <a:lstStyle/>
-            <a:p>
-              <a:pPr algn="ctr"/>
-              <a:endParaRPr lang="en-SG" dirty="0"/>
-            </a:p>
-          </p:txBody>
-        </p:sp>
-        <p:sp>
-          <p:nvSpPr>
-            <p:cNvPr id="8" name="TextBox 7"/>
+            <p:cNvPr id="5" name="TextBox 4"/>
             <p:cNvSpPr txBox="1"/>
             <p:nvPr/>
           </p:nvSpPr>
           <p:spPr>
             <a:xfrm>
-              <a:off x="2223081" y="4781725"/>
-              <a:ext cx="2676090" cy="307777"/>
-            </a:xfrm>
-            <a:prstGeom prst="rect">
-              <a:avLst/>
-            </a:prstGeom>
-            <a:noFill/>
-          </p:spPr>
-          <p:txBody>
-            <a:bodyPr wrap="square" rtlCol="0">
-              <a:spAutoFit/>
-            </a:bodyPr>
-            <a:lstStyle/>
-            <a:p>
-              <a:r>
-                <a:rPr lang="en-SG" sz="1400" dirty="0">
-                  <a:solidFill>
-                    <a:schemeClr val="accent1"/>
-                  </a:solidFill>
-                  <a:latin typeface="Franklin Gothic Medium Cond" panose="020B0606030402020204" pitchFamily="34" charset="0"/>
-                  <a:cs typeface="Times New Roman" panose="02020603050405020304" pitchFamily="18" charset="0"/>
-                </a:rPr>
-                <a:t>Figure 3: Main Window Diagram</a:t>
-              </a:r>
-            </a:p>
-          </p:txBody>
-        </p:sp>
-        <p:sp>
-          <p:nvSpPr>
-            <p:cNvPr id="9" name="TextBox 8"/>
-            <p:cNvSpPr txBox="1"/>
-            <p:nvPr/>
-          </p:nvSpPr>
-          <p:spPr>
-            <a:xfrm>
-              <a:off x="4668760" y="4349475"/>
-              <a:ext cx="1601721" cy="369332"/>
+              <a:off x="1031846" y="5735560"/>
+              <a:ext cx="3894015" cy="400110"/>
             </a:xfrm>
             <a:prstGeom prst="rect">
               <a:avLst/>
@@ -3614,27 +3223,27 @@
             <a:lstStyle/>
             <a:p>
               <a:r>
-                <a:rPr lang="en-SG" dirty="0">
+                <a:rPr lang="en-SG" sz="2000" dirty="0">
                   <a:solidFill>
-                    <a:schemeClr val="bg1"/>
+                    <a:schemeClr val="accent1"/>
                   </a:solidFill>
-                  <a:latin typeface="AR JULIAN" panose="02000000000000000000" pitchFamily="2" charset="0"/>
+                  <a:latin typeface="Eras Light ITC" panose="020B0402030504020804" pitchFamily="34" charset="0"/>
                 </a:rPr>
-                <a:t>Command Box</a:t>
+                <a:t>Figure 2: Main Window of Linenux</a:t>
               </a:r>
             </a:p>
           </p:txBody>
         </p:sp>
         <p:sp>
           <p:nvSpPr>
-            <p:cNvPr id="10" name="TextBox 9"/>
+            <p:cNvPr id="6" name="TextBox 5"/>
             <p:cNvSpPr txBox="1"/>
             <p:nvPr/>
           </p:nvSpPr>
           <p:spPr>
             <a:xfrm>
-              <a:off x="2508307" y="2768203"/>
-              <a:ext cx="1107347" cy="276999"/>
+              <a:off x="1031846" y="2294281"/>
+              <a:ext cx="1066318" cy="307777"/>
             </a:xfrm>
             <a:prstGeom prst="rect">
               <a:avLst/>
@@ -3642,19 +3251,17 @@
             <a:noFill/>
           </p:spPr>
           <p:txBody>
-            <a:bodyPr wrap="square" rtlCol="0">
+            <a:bodyPr wrap="none" rtlCol="0">
               <a:spAutoFit/>
             </a:bodyPr>
             <a:lstStyle/>
             <a:p>
               <a:r>
-                <a:rPr lang="en-SG" sz="1200" dirty="0">
+                <a:rPr lang="en-SG" sz="1400" dirty="0">
                   <a:solidFill>
-                    <a:schemeClr val="bg2">
-                      <a:lumMod val="25000"/>
-                    </a:schemeClr>
+                    <a:schemeClr val="bg1"/>
                   </a:solidFill>
-                  <a:latin typeface="AR JULIAN" panose="02000000000000000000" pitchFamily="2" charset="0"/>
+                  <a:latin typeface="Eras Light ITC" panose="020B0402030504020804" pitchFamily="34" charset="0"/>
                 </a:rPr>
                 <a:t>To-do Panel</a:t>
               </a:r>
@@ -3663,14 +3270,14 @@
         </p:sp>
         <p:sp>
           <p:nvSpPr>
-            <p:cNvPr id="11" name="TextBox 10"/>
+            <p:cNvPr id="7" name="TextBox 6"/>
             <p:cNvSpPr txBox="1"/>
             <p:nvPr/>
           </p:nvSpPr>
           <p:spPr>
             <a:xfrm>
-              <a:off x="4009238" y="2768204"/>
-              <a:ext cx="1296099" cy="276999"/>
+              <a:off x="4011063" y="2294281"/>
+              <a:ext cx="1305165" cy="307777"/>
             </a:xfrm>
             <a:prstGeom prst="rect">
               <a:avLst/>
@@ -3678,21 +3285,125 @@
             <a:noFill/>
           </p:spPr>
           <p:txBody>
-            <a:bodyPr wrap="square" rtlCol="0">
+            <a:bodyPr wrap="none" rtlCol="0">
               <a:spAutoFit/>
             </a:bodyPr>
             <a:lstStyle/>
             <a:p>
               <a:r>
-                <a:rPr lang="en-SG" sz="1200" dirty="0">
+                <a:rPr lang="en-SG" sz="1400" dirty="0">
                   <a:solidFill>
-                    <a:schemeClr val="bg2">
-                      <a:lumMod val="25000"/>
-                    </a:schemeClr>
+                    <a:schemeClr val="bg1"/>
                   </a:solidFill>
-                  <a:latin typeface="AR JULIAN" panose="02000000000000000000" pitchFamily="2" charset="0"/>
+                  <a:latin typeface="Eras Light ITC" panose="020B0402030504020804" pitchFamily="34" charset="0"/>
                 </a:rPr>
                 <a:t>Deadline Panel</a:t>
+              </a:r>
+            </a:p>
+          </p:txBody>
+        </p:sp>
+        <p:cxnSp>
+          <p:nvCxnSpPr>
+            <p:cNvPr id="9" name="Straight Connector 8"/>
+            <p:cNvCxnSpPr/>
+            <p:nvPr/>
+          </p:nvCxnSpPr>
+          <p:spPr>
+            <a:xfrm>
+              <a:off x="3969391" y="453006"/>
+              <a:ext cx="0" cy="4051882"/>
+            </a:xfrm>
+            <a:prstGeom prst="line">
+              <a:avLst/>
+            </a:prstGeom>
+            <a:ln>
+              <a:solidFill>
+                <a:schemeClr val="bg1"/>
+              </a:solidFill>
+              <a:prstDash val="dash"/>
+            </a:ln>
+          </p:spPr>
+          <p:style>
+            <a:lnRef idx="1">
+              <a:schemeClr val="accent1"/>
+            </a:lnRef>
+            <a:fillRef idx="0">
+              <a:schemeClr val="accent1"/>
+            </a:fillRef>
+            <a:effectRef idx="0">
+              <a:schemeClr val="accent1"/>
+            </a:effectRef>
+            <a:fontRef idx="minor">
+              <a:schemeClr val="tx1"/>
+            </a:fontRef>
+          </p:style>
+        </p:cxnSp>
+        <p:cxnSp>
+          <p:nvCxnSpPr>
+            <p:cNvPr id="10" name="Straight Connector 9"/>
+            <p:cNvCxnSpPr/>
+            <p:nvPr/>
+          </p:nvCxnSpPr>
+          <p:spPr>
+            <a:xfrm>
+              <a:off x="7007604" y="453006"/>
+              <a:ext cx="0" cy="4051882"/>
+            </a:xfrm>
+            <a:prstGeom prst="line">
+              <a:avLst/>
+            </a:prstGeom>
+            <a:ln>
+              <a:solidFill>
+                <a:schemeClr val="bg1"/>
+              </a:solidFill>
+              <a:prstDash val="dash"/>
+            </a:ln>
+          </p:spPr>
+          <p:style>
+            <a:lnRef idx="1">
+              <a:schemeClr val="accent1"/>
+            </a:lnRef>
+            <a:fillRef idx="0">
+              <a:schemeClr val="accent1"/>
+            </a:fillRef>
+            <a:effectRef idx="0">
+              <a:schemeClr val="accent1"/>
+            </a:effectRef>
+            <a:fontRef idx="minor">
+              <a:schemeClr val="tx1"/>
+            </a:fontRef>
+          </p:style>
+        </p:cxnSp>
+        <p:sp>
+          <p:nvSpPr>
+            <p:cNvPr id="11" name="TextBox 10"/>
+            <p:cNvSpPr txBox="1"/>
+            <p:nvPr/>
+          </p:nvSpPr>
+          <p:spPr>
+            <a:xfrm>
+              <a:off x="7049275" y="2294281"/>
+              <a:ext cx="1051891" cy="307777"/>
+            </a:xfrm>
+            <a:prstGeom prst="rect">
+              <a:avLst/>
+            </a:prstGeom>
+            <a:noFill/>
+          </p:spPr>
+          <p:txBody>
+            <a:bodyPr wrap="none" rtlCol="0">
+              <a:spAutoFit/>
+            </a:bodyPr>
+            <a:lstStyle/>
+            <a:p>
+              <a:r>
+                <a:rPr lang="en-SG" sz="1400" dirty="0">
+                  <a:solidFill>
+                    <a:schemeClr val="bg1"/>
+                  </a:solidFill>
+                  <a:latin typeface="Eras Light ITC" panose="020B0402030504020804" pitchFamily="34" charset="0"/>
+                </a:rPr>
+                <a:t>Event Panel</a:t>
               </a:r>
             </a:p>
           </p:txBody>
@@ -3705,8 +3416,8 @@
           </p:nvSpPr>
           <p:spPr>
             <a:xfrm>
-              <a:off x="5714999" y="2759733"/>
-              <a:ext cx="1075192" cy="276999"/>
+              <a:off x="1031846" y="4843279"/>
+              <a:ext cx="1167307" cy="307777"/>
             </a:xfrm>
             <a:prstGeom prst="rect">
               <a:avLst/>
@@ -3714,21 +3425,19 @@
             <a:noFill/>
           </p:spPr>
           <p:txBody>
-            <a:bodyPr wrap="square" rtlCol="0">
+            <a:bodyPr wrap="none" rtlCol="0">
               <a:spAutoFit/>
             </a:bodyPr>
             <a:lstStyle/>
             <a:p>
               <a:r>
-                <a:rPr lang="en-SG" sz="1200" dirty="0">
+                <a:rPr lang="en-SG" sz="1400" dirty="0">
                   <a:solidFill>
-                    <a:schemeClr val="bg2">
-                      <a:lumMod val="25000"/>
-                    </a:schemeClr>
+                    <a:schemeClr val="bg1"/>
                   </a:solidFill>
-                  <a:latin typeface="AR JULIAN" panose="02000000000000000000" pitchFamily="2" charset="0"/>
+                  <a:latin typeface="Eras Light ITC" panose="020B0402030504020804" pitchFamily="34" charset="0"/>
                 </a:rPr>
-                <a:t>Event Panel</a:t>
+                <a:t>Display Panel</a:t>
               </a:r>
             </a:p>
           </p:txBody>
@@ -3741,8 +3450,8 @@
           </p:nvSpPr>
           <p:spPr>
             <a:xfrm>
-              <a:off x="7239350" y="2768203"/>
-              <a:ext cx="1217104" cy="276999"/>
+              <a:off x="1031846" y="5491287"/>
+              <a:ext cx="1303562" cy="307777"/>
             </a:xfrm>
             <a:prstGeom prst="rect">
               <a:avLst/>
@@ -3750,21 +3459,19 @@
             <a:noFill/>
           </p:spPr>
           <p:txBody>
-            <a:bodyPr wrap="square" rtlCol="0">
+            <a:bodyPr wrap="none" rtlCol="0">
               <a:spAutoFit/>
             </a:bodyPr>
             <a:lstStyle/>
             <a:p>
               <a:r>
-                <a:rPr lang="en-SG" sz="1200" dirty="0">
+                <a:rPr lang="en-SG" sz="1400" dirty="0">
                   <a:solidFill>
-                    <a:schemeClr val="bg2">
-                      <a:lumMod val="25000"/>
-                    </a:schemeClr>
+                    <a:schemeClr val="bg1"/>
                   </a:solidFill>
-                  <a:latin typeface="AR JULIAN" panose="02000000000000000000" pitchFamily="2" charset="0"/>
+                  <a:latin typeface="Eras Light ITC" panose="020B0402030504020804" pitchFamily="34" charset="0"/>
                 </a:rPr>
-                <a:t>Display Panel</a:t>
+                <a:t>Command Box</a:t>
               </a:r>
             </a:p>
           </p:txBody>
@@ -3773,7 +3480,7 @@
     </p:spTree>
     <p:extLst>
       <p:ext uri="{BB962C8B-B14F-4D97-AF65-F5344CB8AC3E}">
-        <p14:creationId xmlns:p14="http://schemas.microsoft.com/office/powerpoint/2010/main" val="166592964"/>
+        <p14:creationId xmlns:p14="http://schemas.microsoft.com/office/powerpoint/2010/main" val="3842203454"/>
       </p:ext>
     </p:extLst>
   </p:cSld>

</xml_diff>